<commit_message>
updated with draft readme
</commit_message>
<xml_diff>
--- a/Stock Market Analysis.pptx
+++ b/Stock Market Analysis.pptx
@@ -136,7 +136,7 @@
   <pc:docChgLst>
     <pc:chgData name="Gabriel Allen" userId="c7c74c84cd207ce6" providerId="LiveId" clId="{BD585F1B-4D9A-4C89-9F76-E500BE26A5CA}"/>
     <pc:docChg chg="undo redo custSel addSld delSld modSld sldOrd">
-      <pc:chgData name="Gabriel Allen" userId="c7c74c84cd207ce6" providerId="LiveId" clId="{BD585F1B-4D9A-4C89-9F76-E500BE26A5CA}" dt="2021-02-01T22:26:38.372" v="2378" actId="2711"/>
+      <pc:chgData name="Gabriel Allen" userId="c7c74c84cd207ce6" providerId="LiveId" clId="{BD585F1B-4D9A-4C89-9F76-E500BE26A5CA}" dt="2021-02-02T05:11:29.821" v="2548" actId="33524"/>
       <pc:docMkLst>
         <pc:docMk/>
       </pc:docMkLst>
@@ -415,7 +415,7 @@
         </pc:picChg>
       </pc:sldChg>
       <pc:sldChg chg="addSp delSp modSp new mod ord">
-        <pc:chgData name="Gabriel Allen" userId="c7c74c84cd207ce6" providerId="LiveId" clId="{BD585F1B-4D9A-4C89-9F76-E500BE26A5CA}" dt="2021-02-01T21:32:20.416" v="644" actId="1076"/>
+        <pc:chgData name="Gabriel Allen" userId="c7c74c84cd207ce6" providerId="LiveId" clId="{BD585F1B-4D9A-4C89-9F76-E500BE26A5CA}" dt="2021-02-02T05:11:29.821" v="2548" actId="33524"/>
         <pc:sldMkLst>
           <pc:docMk/>
           <pc:sldMk cId="1366965708" sldId="296"/>
@@ -429,7 +429,7 @@
           </ac:spMkLst>
         </pc:spChg>
         <pc:spChg chg="mod">
-          <ac:chgData name="Gabriel Allen" userId="c7c74c84cd207ce6" providerId="LiveId" clId="{BD585F1B-4D9A-4C89-9F76-E500BE26A5CA}" dt="2021-02-01T21:20:57.498" v="621" actId="20577"/>
+          <ac:chgData name="Gabriel Allen" userId="c7c74c84cd207ce6" providerId="LiveId" clId="{BD585F1B-4D9A-4C89-9F76-E500BE26A5CA}" dt="2021-02-02T05:11:29.821" v="2548" actId="33524"/>
           <ac:spMkLst>
             <pc:docMk/>
             <pc:sldMk cId="1366965708" sldId="296"/>
@@ -4827,16 +4827,16 @@
                 </a:solidFill>
                 <a:effectLst/>
               </a:rPr>
-              <a:t>), have underperformed the broader market over the past year. IHE has provided a total return of 16.3% over the last 12 months, below the Russell 1000's total return of 21.9%, as of December 2, 2020.</a:t>
-            </a:r>
-            <a:r>
-              <a:rPr lang="en-US" b="0" i="0" u="none" strike="noStrike" baseline="30000" dirty="0">
+              <a:t>), have underperformed the broader market over the past year. IHE has provided a total return of 16.3% over the last 12 months, below the Russell 1000's total return of 21.9%, as of December 2, 2020. All information outlined in this presentation is current as of February 1</a:t>
+            </a:r>
+            <a:r>
+              <a:rPr lang="en-US" b="0" i="0" baseline="30000" dirty="0">
                 <a:solidFill>
-                  <a:srgbClr val="0000EE"/>
+                  <a:srgbClr val="111111"/>
                 </a:solidFill>
                 <a:effectLst/>
               </a:rPr>
-              <a:t>1</a:t>
+              <a:t>st</a:t>
             </a:r>
             <a:r>
               <a:rPr lang="en-US" b="0" i="0" dirty="0">
@@ -4845,7 +4845,7 @@
                 </a:solidFill>
                 <a:effectLst/>
               </a:rPr>
-              <a:t>﻿ All statistics in the tables below are as of December 3.</a:t>
+              <a:t>, 2021.</a:t>
             </a:r>
           </a:p>
           <a:p>
@@ -13166,15 +13166,6 @@
 </file>
 
 <file path=customXml/item2.xml><?xml version="1.0" encoding="utf-8"?>
-<?mso-contentType ?>
-<FormTemplates xmlns="http://schemas.microsoft.com/sharepoint/v3/contenttype/forms">
-  <Display>DocumentLibraryForm</Display>
-  <Edit>DocumentLibraryForm</Edit>
-  <New>DocumentLibraryForm</New>
-</FormTemplates>
-</file>
-
-<file path=customXml/item3.xml><?xml version="1.0" encoding="utf-8"?>
 <ct:contentTypeSchema xmlns:ct="http://schemas.microsoft.com/office/2006/metadata/contentType" xmlns:ma="http://schemas.microsoft.com/office/2006/metadata/properties/metaAttributes" ct:_="" ma:_="" ma:contentTypeName="Document" ma:contentTypeID="0x01010079F111ED35F8CC479449609E8A0923A6" ma:contentTypeVersion="12" ma:contentTypeDescription="Create a new document." ma:contentTypeScope="" ma:versionID="a410dd7f93c95333ffa1b60ed6adedd1">
   <xsd:schema xmlns:xsd="http://www.w3.org/2001/XMLSchema" xmlns:xs="http://www.w3.org/2001/XMLSchema" xmlns:p="http://schemas.microsoft.com/office/2006/metadata/properties" xmlns:ns2="71af3243-3dd4-4a8d-8c0d-dd76da1f02a5" xmlns:ns3="16c05727-aa75-4e4a-9b5f-8a80a1165891" targetNamespace="http://schemas.microsoft.com/office/2006/metadata/properties" ma:root="true" ma:fieldsID="a936d9baba76aa3866493feff160faab" ns2:_="" ns3:_="">
     <xsd:import namespace="71af3243-3dd4-4a8d-8c0d-dd76da1f02a5"/>
@@ -13395,6 +13386,15 @@
 </ct:contentTypeSchema>
 </file>
 
+<file path=customXml/item3.xml><?xml version="1.0" encoding="utf-8"?>
+<?mso-contentType ?>
+<FormTemplates xmlns="http://schemas.microsoft.com/sharepoint/v3/contenttype/forms">
+  <Display>DocumentLibraryForm</Display>
+  <Edit>DocumentLibraryForm</Edit>
+  <New>DocumentLibraryForm</New>
+</FormTemplates>
+</file>
+
 <file path=customXml/itemProps1.xml><?xml version="1.0" encoding="utf-8"?>
 <ds:datastoreItem xmlns:ds="http://schemas.openxmlformats.org/officeDocument/2006/customXml" ds:itemID="{FBD2D995-20F0-4C14-BF62-1248AB4B484D}">
   <ds:schemaRefs>
@@ -13406,14 +13406,6 @@
 </file>
 
 <file path=customXml/itemProps2.xml><?xml version="1.0" encoding="utf-8"?>
-<ds:datastoreItem xmlns:ds="http://schemas.openxmlformats.org/officeDocument/2006/customXml" ds:itemID="{BB3242A4-1E6A-4E02-809C-4A24066EC01D}">
-  <ds:schemaRefs>
-    <ds:schemaRef ds:uri="http://schemas.microsoft.com/sharepoint/v3/contenttype/forms"/>
-  </ds:schemaRefs>
-</ds:datastoreItem>
-</file>
-
-<file path=customXml/itemProps3.xml><?xml version="1.0" encoding="utf-8"?>
 <ds:datastoreItem xmlns:ds="http://schemas.openxmlformats.org/officeDocument/2006/customXml" ds:itemID="{965255AC-12AC-4323-AA35-9BAC798B66BD}">
   <ds:schemaRefs>
     <ds:schemaRef ds:uri="http://schemas.microsoft.com/office/2006/metadata/contentType"/>
@@ -13430,4 +13422,12 @@
     <ds:schemaRef ds:uri="http://schemas.microsoft.com/internal/obd"/>
   </ds:schemaRefs>
 </ds:datastoreItem>
+</file>
+
+<file path=customXml/itemProps3.xml><?xml version="1.0" encoding="utf-8"?>
+<ds:datastoreItem xmlns:ds="http://schemas.openxmlformats.org/officeDocument/2006/customXml" ds:itemID="{BB3242A4-1E6A-4E02-809C-4A24066EC01D}">
+  <ds:schemaRefs>
+    <ds:schemaRef ds:uri="http://schemas.microsoft.com/sharepoint/v3/contenttype/forms"/>
+  </ds:schemaRefs>
+</ds:datastoreItem>
 </file>
</xml_diff>